<commit_message>
add powerpoint file of sofiane
</commit_message>
<xml_diff>
--- a/Final project.pptx
+++ b/Final project.pptx
@@ -6805,7 +6805,7 @@
         </p:nvSpPr>
         <p:spPr>
           <a:xfrm>
-            <a:off x="733426" y="2879021"/>
+            <a:off x="733426" y="3001569"/>
             <a:ext cx="5362574" cy="2767648"/>
           </a:xfrm>
           <a:prstGeom prst="rect">
@@ -7382,7 +7382,7 @@
                   </a:outerShdw>
                 </a:effectLst>
               </a:rPr>
-              <a:t>   L1 SIGL, USTHB                      31 </a:t>
+              <a:t>   L1 SIGL, USTHB                      04 </a:t>
             </a:r>
             <a:r>
               <a:rPr lang="en-US" sz="2400" b="1" dirty="0" err="1">
@@ -7397,7 +7397,7 @@
                   </a:outerShdw>
                 </a:effectLst>
               </a:rPr>
-              <a:t>december</a:t>
+              <a:t>january</a:t>
             </a:r>
             <a:r>
               <a:rPr lang="en-US" sz="2400" b="1" dirty="0">
@@ -7412,7 +7412,7 @@
                   </a:outerShdw>
                 </a:effectLst>
               </a:rPr>
-              <a:t> 2023</a:t>
+              <a:t> 2024</a:t>
             </a:r>
             <a:endParaRPr lang="fr-FR" sz="2400" b="1" dirty="0">
               <a:solidFill>

</xml_diff>